<commit_message>
Am modificat caract la state of the art
</commit_message>
<xml_diff>
--- a/Prezentare/Termostat inteligent controlat printr-o aplicație web.pptx
+++ b/Prezentare/Termostat inteligent controlat printr-o aplicație web.pptx
@@ -223,7 +223,7 @@
           <a:p>
             <a:fld id="{B8F87DBE-C843-456A-9381-003F0E3F9C44}" type="datetimeFigureOut">
               <a:rPr lang="en-US" smtClean="0"/>
-              <a:t>5/31/2021</a:t>
+              <a:t>6/1/2021</a:t>
             </a:fld>
             <a:endParaRPr lang="en-US"/>
           </a:p>
@@ -401,7 +401,7 @@
           <a:p>
             <a:fld id="{FB146702-3091-4893-9580-351D3F327990}" type="datetimeFigureOut">
               <a:rPr lang="en-US" smtClean="0"/>
-              <a:t>5/31/2021</a:t>
+              <a:t>6/1/2021</a:t>
             </a:fld>
             <a:endParaRPr lang="en-US"/>
           </a:p>
@@ -858,7 +858,7 @@
           <a:p>
             <a:fld id="{30F82038-E678-4ECF-BEDB-85A5C5D4839D}" type="datetime1">
               <a:rPr lang="en-US" smtClean="0"/>
-              <a:t>5/31/2021</a:t>
+              <a:t>6/1/2021</a:t>
             </a:fld>
             <a:endParaRPr lang="en-US"/>
           </a:p>
@@ -1196,7 +1196,7 @@
           <a:p>
             <a:fld id="{98FEAE57-41B8-4424-9352-E75A9291ED21}" type="datetime1">
               <a:rPr lang="en-US" smtClean="0"/>
-              <a:t>5/31/2021</a:t>
+              <a:t>6/1/2021</a:t>
             </a:fld>
             <a:endParaRPr lang="en-US"/>
           </a:p>
@@ -1597,7 +1597,7 @@
           <a:p>
             <a:fld id="{8B5AB100-4FF4-4F37-A93F-ABC989278D09}" type="datetime1">
               <a:rPr lang="en-US" smtClean="0"/>
-              <a:t>5/31/2021</a:t>
+              <a:t>6/1/2021</a:t>
             </a:fld>
             <a:endParaRPr lang="en-US"/>
           </a:p>
@@ -1933,7 +1933,7 @@
           <a:p>
             <a:fld id="{4A42E1C9-DE8F-45CF-9014-53AF507E26B6}" type="datetime1">
               <a:rPr lang="en-US" smtClean="0"/>
-              <a:t>5/31/2021</a:t>
+              <a:t>6/1/2021</a:t>
             </a:fld>
             <a:endParaRPr lang="en-US"/>
           </a:p>
@@ -2253,7 +2253,7 @@
           <a:p>
             <a:fld id="{691321E4-876A-446D-805C-931D38442A39}" type="datetime1">
               <a:rPr lang="en-US" smtClean="0"/>
-              <a:t>5/31/2021</a:t>
+              <a:t>6/1/2021</a:t>
             </a:fld>
             <a:endParaRPr lang="en-US"/>
           </a:p>
@@ -2649,7 +2649,7 @@
           <a:p>
             <a:fld id="{FE8C92CE-1D3F-4EAC-8D07-6011AB081639}" type="datetime1">
               <a:rPr lang="en-US" smtClean="0"/>
-              <a:t>5/31/2021</a:t>
+              <a:t>6/1/2021</a:t>
             </a:fld>
             <a:endParaRPr lang="en-US"/>
           </a:p>
@@ -2906,7 +2906,7 @@
           <a:p>
             <a:fld id="{BE952FF4-6C99-4BB7-8B86-45E6A3CD6E25}" type="datetime1">
               <a:rPr lang="en-US" smtClean="0"/>
-              <a:t>5/31/2021</a:t>
+              <a:t>6/1/2021</a:t>
             </a:fld>
             <a:endParaRPr lang="en-US"/>
           </a:p>
@@ -3168,7 +3168,7 @@
           <a:p>
             <a:fld id="{3793CB2C-024F-4230-8160-47AC7F613CD6}" type="datetime1">
               <a:rPr lang="en-US" smtClean="0"/>
-              <a:t>5/31/2021</a:t>
+              <a:t>6/1/2021</a:t>
             </a:fld>
             <a:endParaRPr lang="en-US"/>
           </a:p>
@@ -3435,7 +3435,7 @@
           <a:p>
             <a:fld id="{EF2F0734-55FC-4D31-BBAC-CFD270F97A82}" type="datetime1">
               <a:rPr lang="en-US" smtClean="0"/>
-              <a:t>5/31/2021</a:t>
+              <a:t>6/1/2021</a:t>
             </a:fld>
             <a:endParaRPr lang="en-US" dirty="0"/>
           </a:p>
@@ -3704,7 +3704,7 @@
           <a:p>
             <a:fld id="{A8035693-5B48-46BA-8731-C60905FDB4BB}" type="datetime1">
               <a:rPr lang="en-US" smtClean="0"/>
-              <a:t>5/31/2021</a:t>
+              <a:t>6/1/2021</a:t>
             </a:fld>
             <a:endParaRPr lang="en-US"/>
           </a:p>
@@ -4027,7 +4027,7 @@
           <a:p>
             <a:fld id="{4ED3114C-4F90-498B-9102-5DD35911FEC7}" type="datetime1">
               <a:rPr lang="en-US" smtClean="0"/>
-              <a:t>5/31/2021</a:t>
+              <a:t>6/1/2021</a:t>
             </a:fld>
             <a:endParaRPr lang="en-US"/>
           </a:p>
@@ -4484,7 +4484,7 @@
           <a:p>
             <a:fld id="{9043E49F-08D7-4685-B777-AA41236FB79C}" type="datetime1">
               <a:rPr lang="en-US" smtClean="0"/>
-              <a:t>5/31/2021</a:t>
+              <a:t>6/1/2021</a:t>
             </a:fld>
             <a:endParaRPr lang="en-US"/>
           </a:p>
@@ -4689,7 +4689,7 @@
           <a:p>
             <a:fld id="{A11EB4FF-AC58-4F96-BF45-BAC7049BEFBC}" type="datetime1">
               <a:rPr lang="en-US" smtClean="0"/>
-              <a:t>5/31/2021</a:t>
+              <a:t>6/1/2021</a:t>
             </a:fld>
             <a:endParaRPr lang="en-US"/>
           </a:p>
@@ -4866,7 +4866,7 @@
           <a:p>
             <a:fld id="{BFDC7A8E-631A-4994-9E85-C431A7496471}" type="datetime1">
               <a:rPr lang="en-US" smtClean="0"/>
-              <a:t>5/31/2021</a:t>
+              <a:t>6/1/2021</a:t>
             </a:fld>
             <a:endParaRPr lang="en-US"/>
           </a:p>
@@ -5199,7 +5199,7 @@
           <a:p>
             <a:fld id="{0DCF6632-148F-4474-BA59-DB71F1721872}" type="datetime1">
               <a:rPr lang="en-US" smtClean="0"/>
-              <a:t>5/31/2021</a:t>
+              <a:t>6/1/2021</a:t>
             </a:fld>
             <a:endParaRPr lang="en-US"/>
           </a:p>
@@ -5544,7 +5544,7 @@
           <a:p>
             <a:fld id="{7A070EAA-60D7-42AA-8723-1B0860A455E4}" type="datetime1">
               <a:rPr lang="en-US" smtClean="0"/>
-              <a:t>5/31/2021</a:t>
+              <a:t>6/1/2021</a:t>
             </a:fld>
             <a:endParaRPr lang="en-US"/>
           </a:p>
@@ -7683,7 +7683,7 @@
           <a:p>
             <a:fld id="{77CAE326-6785-470D-B4C6-EC533BA72C64}" type="datetime1">
               <a:rPr lang="en-US" smtClean="0"/>
-              <a:t>5/31/2021</a:t>
+              <a:t>6/1/2021</a:t>
             </a:fld>
             <a:endParaRPr lang="en-US"/>
           </a:p>
@@ -8669,7 +8669,7 @@
           </a:bodyPr>
           <a:lstStyle/>
           <a:p>
-            <a:pPr>
+            <a:pPr algn="just">
               <a:buFont typeface="Arial" panose="020B0604020202020204" pitchFamily="34" charset="0"/>
               <a:buChar char="•"/>
             </a:pPr>
@@ -8677,9 +8677,14 @@
               <a:rPr lang="ro-RO" sz="2200" dirty="0"/>
               <a:t>Scopul proiectului este de a prezenta o soluție pentru controlul temperaturii în mai multe zone ale locuinței, dar și pentru reducerea consumului de energie</a:t>
             </a:r>
-          </a:p>
-          <a:p>
-            <a:pPr>
+            <a:r>
+              <a:rPr lang="en-US" sz="2200" dirty="0"/>
+              <a:t>.</a:t>
+            </a:r>
+            <a:endParaRPr lang="ro-RO" sz="2200" dirty="0"/>
+          </a:p>
+          <a:p>
+            <a:pPr algn="just">
               <a:buFont typeface="Arial" panose="020B0604020202020204" pitchFamily="34" charset="0"/>
               <a:buChar char="•"/>
             </a:pPr>
@@ -8687,9 +8692,14 @@
               <a:rPr lang="ro-RO" sz="2200" dirty="0"/>
               <a:t>Există o serie de funcționalități al căror mod de operare poate fi îmbunătățit</a:t>
             </a:r>
-          </a:p>
-          <a:p>
-            <a:pPr>
+            <a:r>
+              <a:rPr lang="en-US" sz="2200" dirty="0"/>
+              <a:t>.</a:t>
+            </a:r>
+            <a:endParaRPr lang="ro-RO" sz="2200" dirty="0"/>
+          </a:p>
+          <a:p>
+            <a:pPr algn="just">
               <a:buFont typeface="Arial" panose="020B0604020202020204" pitchFamily="34" charset="0"/>
               <a:buChar char="•"/>
             </a:pPr>
@@ -8703,7 +8713,7 @@
             </a:r>
           </a:p>
           <a:p>
-            <a:pPr lvl="1">
+            <a:pPr lvl="1" algn="just">
               <a:buFont typeface="Wingdings" panose="05000000000000000000" pitchFamily="2" charset="2"/>
               <a:buChar char="Ø"/>
             </a:pPr>
@@ -8713,7 +8723,7 @@
             </a:r>
           </a:p>
           <a:p>
-            <a:pPr lvl="1">
+            <a:pPr lvl="1" algn="just">
               <a:buFont typeface="Wingdings" panose="05000000000000000000" pitchFamily="2" charset="2"/>
               <a:buChar char="Ø"/>
             </a:pPr>
@@ -8723,7 +8733,7 @@
             </a:r>
           </a:p>
           <a:p>
-            <a:pPr lvl="1">
+            <a:pPr lvl="1" algn="just">
               <a:buFont typeface="Wingdings" panose="05000000000000000000" pitchFamily="2" charset="2"/>
               <a:buChar char="Ø"/>
             </a:pPr>
@@ -8868,7 +8878,7 @@
           <a:bodyPr/>
           <a:lstStyle/>
           <a:p>
-            <a:pPr>
+            <a:pPr algn="just">
               <a:buFont typeface="Arial" panose="020B0604020202020204" pitchFamily="34" charset="0"/>
               <a:buChar char="•"/>
             </a:pPr>
@@ -8891,7 +8901,7 @@
             <a:endParaRPr lang="ro-RO" sz="2200" dirty="0"/>
           </a:p>
           <a:p>
-            <a:pPr lvl="1">
+            <a:pPr lvl="1" algn="just">
               <a:buFont typeface="Wingdings" panose="05000000000000000000" pitchFamily="2" charset="2"/>
               <a:buChar char="Ø"/>
             </a:pPr>
@@ -8906,7 +8916,7 @@
             <a:endParaRPr lang="en-US" sz="2000" dirty="0"/>
           </a:p>
           <a:p>
-            <a:pPr lvl="1">
+            <a:pPr lvl="1" algn="just">
               <a:buFont typeface="Wingdings" panose="05000000000000000000" pitchFamily="2" charset="2"/>
               <a:buChar char="Ø"/>
             </a:pPr>
@@ -8936,7 +8946,7 @@
             </a:r>
           </a:p>
           <a:p>
-            <a:pPr lvl="1">
+            <a:pPr lvl="1" algn="just">
               <a:buFont typeface="Wingdings" panose="05000000000000000000" pitchFamily="2" charset="2"/>
               <a:buChar char="Ø"/>
             </a:pPr>
@@ -8947,7 +8957,7 @@
             <a:endParaRPr lang="en-US" sz="2000" dirty="0"/>
           </a:p>
           <a:p>
-            <a:pPr lvl="1">
+            <a:pPr lvl="1" algn="just">
               <a:buFont typeface="Wingdings" panose="05000000000000000000" pitchFamily="2" charset="2"/>
               <a:buChar char="Ø"/>
             </a:pPr>
@@ -8958,7 +8968,7 @@
             <a:endParaRPr lang="en-US" sz="2000" dirty="0"/>
           </a:p>
           <a:p>
-            <a:pPr lvl="1">
+            <a:pPr lvl="1" algn="just">
               <a:buFont typeface="Wingdings" panose="05000000000000000000" pitchFamily="2" charset="2"/>
               <a:buChar char="Ø"/>
             </a:pPr>
@@ -8969,7 +8979,7 @@
             <a:endParaRPr lang="en-US" sz="2000" dirty="0"/>
           </a:p>
           <a:p>
-            <a:pPr lvl="1">
+            <a:pPr lvl="1" algn="just">
               <a:buFont typeface="Wingdings" panose="05000000000000000000" pitchFamily="2" charset="2"/>
               <a:buChar char="Ø"/>
             </a:pPr>
@@ -9346,7 +9356,7 @@
           </a:bodyPr>
           <a:lstStyle/>
           <a:p>
-            <a:pPr>
+            <a:pPr algn="just">
               <a:buFont typeface="Arial" panose="020B0604020202020204" pitchFamily="34" charset="0"/>
               <a:buChar char="•"/>
             </a:pPr>
@@ -9368,7 +9378,7 @@
             </a:r>
           </a:p>
           <a:p>
-            <a:pPr lvl="1">
+            <a:pPr lvl="1" algn="just">
               <a:buFont typeface="Wingdings" panose="05000000000000000000" pitchFamily="2" charset="2"/>
               <a:buChar char="Ø"/>
             </a:pPr>
@@ -9744,10 +9754,14 @@
               <a:rPr lang="en-US" sz="2000" b="0" i="0" u="none" strike="noStrike" baseline="0" dirty="0" err="1"/>
               <a:t>iuni</a:t>
             </a:r>
+            <a:r>
+              <a:rPr lang="en-US" sz="2000" b="0" i="0" u="none" strike="noStrike" baseline="0" dirty="0"/>
+              <a:t>.</a:t>
+            </a:r>
             <a:endParaRPr lang="en-US" sz="2000" dirty="0"/>
           </a:p>
           <a:p>
-            <a:pPr>
+            <a:pPr algn="just">
               <a:buFont typeface="Arial" panose="020B0604020202020204" pitchFamily="34" charset="0"/>
               <a:buChar char="•"/>
             </a:pPr>
@@ -9761,7 +9775,7 @@
             </a:r>
           </a:p>
           <a:p>
-            <a:pPr lvl="1">
+            <a:pPr lvl="1" algn="just">
               <a:buFont typeface="Wingdings" panose="05000000000000000000" pitchFamily="2" charset="2"/>
               <a:buChar char="Ø"/>
             </a:pPr>
@@ -9776,7 +9790,7 @@
             <a:endParaRPr lang="en-US" sz="2000" dirty="0"/>
           </a:p>
           <a:p>
-            <a:pPr>
+            <a:pPr algn="just">
               <a:buFont typeface="Arial" panose="020B0604020202020204" pitchFamily="34" charset="0"/>
               <a:buChar char="•"/>
             </a:pPr>
@@ -9786,7 +9800,7 @@
             </a:r>
           </a:p>
           <a:p>
-            <a:pPr lvl="1">
+            <a:pPr lvl="1" algn="just">
               <a:buFont typeface="Wingdings" panose="05000000000000000000" pitchFamily="2" charset="2"/>
               <a:buChar char="Ø"/>
             </a:pPr>
@@ -9813,7 +9827,7 @@
             <a:endParaRPr lang="en-US" sz="2000" dirty="0"/>
           </a:p>
           <a:p>
-            <a:pPr lvl="1">
+            <a:pPr lvl="1" algn="just">
               <a:buFont typeface="Wingdings" panose="05000000000000000000" pitchFamily="2" charset="2"/>
               <a:buChar char="Ø"/>
             </a:pPr>
@@ -9832,7 +9846,7 @@
             <a:endParaRPr lang="en-US" sz="2000" dirty="0"/>
           </a:p>
           <a:p>
-            <a:pPr lvl="1">
+            <a:pPr lvl="1" algn="just">
               <a:buFont typeface="Wingdings" panose="05000000000000000000" pitchFamily="2" charset="2"/>
               <a:buChar char="Ø"/>
             </a:pPr>
@@ -9842,6 +9856,7 @@
             </a:r>
           </a:p>
           <a:p>
+            <a:pPr algn="just"/>
             <a:endParaRPr lang="ro-RO" dirty="0"/>
           </a:p>
           <a:p>
@@ -12635,7 +12650,7 @@
               <a:buChar char="•"/>
             </a:pPr>
             <a:r>
-              <a:rPr lang="ro-RO"/>
+              <a:rPr lang="ro-RO" dirty="0"/>
               <a:t>Se produc și comercializează o serie de sisteme asemănătoare.</a:t>
             </a:r>
           </a:p>
@@ -12645,11 +12660,11 @@
               <a:buChar char="•"/>
             </a:pPr>
             <a:r>
-              <a:rPr lang="ro-RO"/>
+              <a:rPr lang="ro-RO" dirty="0"/>
               <a:t>Printre cele mai importante se enumeră</a:t>
             </a:r>
             <a:r>
-              <a:rPr lang="en-US"/>
+              <a:rPr lang="en-US" dirty="0"/>
               <a:t>:</a:t>
             </a:r>
           </a:p>
@@ -12659,10 +12674,10 @@
               <a:buChar char="Ø"/>
             </a:pPr>
             <a:r>
-              <a:rPr lang="en-US" err="1"/>
+              <a:rPr lang="en-US" dirty="0" err="1"/>
               <a:t>Ecobee</a:t>
             </a:r>
-            <a:endParaRPr lang="en-US"/>
+            <a:endParaRPr lang="en-US" dirty="0"/>
           </a:p>
           <a:p>
             <a:pPr lvl="1">
@@ -12670,14 +12685,14 @@
               <a:buChar char="Ø"/>
             </a:pPr>
             <a:r>
-              <a:rPr lang="en-US"/>
+              <a:rPr lang="en-US" dirty="0"/>
               <a:t>Nest</a:t>
             </a:r>
             <a:r>
-              <a:rPr lang="ro-RO"/>
+              <a:rPr lang="ro-RO" dirty="0"/>
               <a:t>  </a:t>
             </a:r>
-            <a:endParaRPr lang="en-US"/>
+            <a:endParaRPr lang="en-US" dirty="0"/>
           </a:p>
           <a:p>
             <a:pPr>
@@ -12685,10 +12700,10 @@
               <a:buChar char="•"/>
             </a:pPr>
             <a:r>
-              <a:rPr lang="ro-RO"/>
+              <a:rPr lang="ro-RO" dirty="0"/>
               <a:t>Cum se diferențiază sistemul creat?</a:t>
             </a:r>
-            <a:endParaRPr lang="en-US"/>
+            <a:endParaRPr lang="en-US" dirty="0"/>
           </a:p>
           <a:p>
             <a:pPr lvl="1">
@@ -12696,10 +12711,10 @@
               <a:buChar char="Ø"/>
             </a:pPr>
             <a:r>
-              <a:rPr lang="ro-RO"/>
+              <a:rPr lang="ro-RO" dirty="0"/>
               <a:t>Cost scăzut</a:t>
             </a:r>
-            <a:endParaRPr lang="en-US"/>
+            <a:endParaRPr lang="en-US" dirty="0"/>
           </a:p>
           <a:p>
             <a:pPr lvl="1">
@@ -12707,10 +12722,10 @@
               <a:buChar char="Ø"/>
             </a:pPr>
             <a:r>
-              <a:rPr lang="ro-RO"/>
+              <a:rPr lang="ro-RO" dirty="0"/>
               <a:t>Posibilitatea de a regla temperatura pe diferite zone din imobil</a:t>
             </a:r>
-            <a:endParaRPr lang="en-US"/>
+            <a:endParaRPr lang="en-US" dirty="0"/>
           </a:p>
         </p:txBody>
       </p:sp>
@@ -12860,6 +12875,11 @@
               <a:rPr lang="ro-RO" sz="2000" dirty="0"/>
               <a:t>Modulele senzor transferă date la modulul de control prin radio – frecvență</a:t>
             </a:r>
+            <a:r>
+              <a:rPr lang="en-US" sz="2000" dirty="0"/>
+              <a:t>.</a:t>
+            </a:r>
+            <a:endParaRPr lang="ro-RO" sz="2000" dirty="0"/>
           </a:p>
           <a:p>
             <a:pPr marL="0" indent="0">
@@ -12879,6 +12899,10 @@
             <a:r>
               <a:rPr lang="ro-RO" sz="2000" dirty="0" err="1"/>
               <a:t>WiFi</a:t>
+            </a:r>
+            <a:r>
+              <a:rPr lang="en-US" sz="2000" dirty="0"/>
+              <a:t>.</a:t>
             </a:r>
             <a:endParaRPr lang="ro-RO" sz="2000" dirty="0"/>
           </a:p>
@@ -13264,6 +13288,10 @@
               <a:rPr lang="ro-RO" sz="2200" dirty="0" err="1"/>
               <a:t>WiFi</a:t>
             </a:r>
+            <a:r>
+              <a:rPr lang="en-US" sz="2200" dirty="0"/>
+              <a:t>.</a:t>
+            </a:r>
             <a:endParaRPr lang="ro-RO" sz="2200" dirty="0"/>
           </a:p>
           <a:p>
@@ -13275,7 +13303,10 @@
               <a:rPr lang="ro-RO" sz="2200" dirty="0"/>
               <a:t>La fiecare apăsare de buton se generează o întrerupere</a:t>
             </a:r>
-            <a:endParaRPr lang="en-US" sz="2200" dirty="0"/>
+            <a:r>
+              <a:rPr lang="en-US" sz="2200" dirty="0"/>
+              <a:t>.</a:t>
+            </a:r>
           </a:p>
         </p:txBody>
       </p:sp>
@@ -13814,7 +13845,7 @@
           </a:bodyPr>
           <a:lstStyle/>
           <a:p>
-            <a:pPr>
+            <a:pPr algn="just">
               <a:buFont typeface="Arial" panose="020B0604020202020204" pitchFamily="34" charset="0"/>
               <a:buChar char="•"/>
             </a:pPr>
@@ -13824,7 +13855,7 @@
             </a:r>
           </a:p>
           <a:p>
-            <a:pPr>
+            <a:pPr algn="just">
               <a:buFont typeface="Arial" panose="020B0604020202020204" pitchFamily="34" charset="0"/>
               <a:buChar char="•"/>
             </a:pPr>
@@ -13872,7 +13903,7 @@
         </p:blipFill>
         <p:spPr>
           <a:xfrm>
-            <a:off x="1" y="0"/>
+            <a:off x="0" y="0"/>
             <a:ext cx="12191999" cy="6858000"/>
           </a:xfrm>
           <a:prstGeom prst="rect">

</xml_diff>